<commit_message>
modified 60, 64, 65
</commit_message>
<xml_diff>
--- a/60. Stack.pptx
+++ b/60. Stack.pptx
@@ -6,12 +6,13 @@
   </p:sldMasterIdLst>
   <p:sldIdLst>
     <p:sldId id="256" r:id="rId2"/>
-    <p:sldId id="257" r:id="rId3"/>
-    <p:sldId id="258" r:id="rId4"/>
-    <p:sldId id="262" r:id="rId5"/>
-    <p:sldId id="260" r:id="rId6"/>
-    <p:sldId id="263" r:id="rId7"/>
-    <p:sldId id="261" r:id="rId8"/>
+    <p:sldId id="264" r:id="rId3"/>
+    <p:sldId id="257" r:id="rId4"/>
+    <p:sldId id="258" r:id="rId5"/>
+    <p:sldId id="262" r:id="rId6"/>
+    <p:sldId id="260" r:id="rId7"/>
+    <p:sldId id="263" r:id="rId8"/>
+    <p:sldId id="261" r:id="rId9"/>
   </p:sldIdLst>
   <p:sldSz cx="12192000" cy="6858000"/>
   <p:notesSz cx="6858000" cy="9144000"/>
@@ -265,7 +266,7 @@
           <a:p>
             <a:fld id="{FD7FDEA3-D540-49FE-978B-AD0BE4744F9A}" type="datetimeFigureOut">
               <a:rPr lang="en-US" smtClean="0"/>
-              <a:t>1/25/2019</a:t>
+              <a:t>1/26/2019</a:t>
             </a:fld>
             <a:endParaRPr lang="en-US"/>
           </a:p>
@@ -463,7 +464,7 @@
           <a:p>
             <a:fld id="{FD7FDEA3-D540-49FE-978B-AD0BE4744F9A}" type="datetimeFigureOut">
               <a:rPr lang="en-US" smtClean="0"/>
-              <a:t>1/25/2019</a:t>
+              <a:t>1/26/2019</a:t>
             </a:fld>
             <a:endParaRPr lang="en-US"/>
           </a:p>
@@ -671,7 +672,7 @@
           <a:p>
             <a:fld id="{FD7FDEA3-D540-49FE-978B-AD0BE4744F9A}" type="datetimeFigureOut">
               <a:rPr lang="en-US" smtClean="0"/>
-              <a:t>1/25/2019</a:t>
+              <a:t>1/26/2019</a:t>
             </a:fld>
             <a:endParaRPr lang="en-US"/>
           </a:p>
@@ -869,7 +870,7 @@
           <a:p>
             <a:fld id="{FD7FDEA3-D540-49FE-978B-AD0BE4744F9A}" type="datetimeFigureOut">
               <a:rPr lang="en-US" smtClean="0"/>
-              <a:t>1/25/2019</a:t>
+              <a:t>1/26/2019</a:t>
             </a:fld>
             <a:endParaRPr lang="en-US"/>
           </a:p>
@@ -1144,7 +1145,7 @@
           <a:p>
             <a:fld id="{FD7FDEA3-D540-49FE-978B-AD0BE4744F9A}" type="datetimeFigureOut">
               <a:rPr lang="en-US" smtClean="0"/>
-              <a:t>1/25/2019</a:t>
+              <a:t>1/26/2019</a:t>
             </a:fld>
             <a:endParaRPr lang="en-US"/>
           </a:p>
@@ -1409,7 +1410,7 @@
           <a:p>
             <a:fld id="{FD7FDEA3-D540-49FE-978B-AD0BE4744F9A}" type="datetimeFigureOut">
               <a:rPr lang="en-US" smtClean="0"/>
-              <a:t>1/25/2019</a:t>
+              <a:t>1/26/2019</a:t>
             </a:fld>
             <a:endParaRPr lang="en-US"/>
           </a:p>
@@ -1821,7 +1822,7 @@
           <a:p>
             <a:fld id="{FD7FDEA3-D540-49FE-978B-AD0BE4744F9A}" type="datetimeFigureOut">
               <a:rPr lang="en-US" smtClean="0"/>
-              <a:t>1/25/2019</a:t>
+              <a:t>1/26/2019</a:t>
             </a:fld>
             <a:endParaRPr lang="en-US"/>
           </a:p>
@@ -1962,7 +1963,7 @@
           <a:p>
             <a:fld id="{FD7FDEA3-D540-49FE-978B-AD0BE4744F9A}" type="datetimeFigureOut">
               <a:rPr lang="en-US" smtClean="0"/>
-              <a:t>1/25/2019</a:t>
+              <a:t>1/26/2019</a:t>
             </a:fld>
             <a:endParaRPr lang="en-US"/>
           </a:p>
@@ -2075,7 +2076,7 @@
           <a:p>
             <a:fld id="{FD7FDEA3-D540-49FE-978B-AD0BE4744F9A}" type="datetimeFigureOut">
               <a:rPr lang="en-US" smtClean="0"/>
-              <a:t>1/25/2019</a:t>
+              <a:t>1/26/2019</a:t>
             </a:fld>
             <a:endParaRPr lang="en-US"/>
           </a:p>
@@ -2386,7 +2387,7 @@
           <a:p>
             <a:fld id="{FD7FDEA3-D540-49FE-978B-AD0BE4744F9A}" type="datetimeFigureOut">
               <a:rPr lang="en-US" smtClean="0"/>
-              <a:t>1/25/2019</a:t>
+              <a:t>1/26/2019</a:t>
             </a:fld>
             <a:endParaRPr lang="en-US"/>
           </a:p>
@@ -2674,7 +2675,7 @@
           <a:p>
             <a:fld id="{FD7FDEA3-D540-49FE-978B-AD0BE4744F9A}" type="datetimeFigureOut">
               <a:rPr lang="en-US" smtClean="0"/>
-              <a:t>1/25/2019</a:t>
+              <a:t>1/26/2019</a:t>
             </a:fld>
             <a:endParaRPr lang="en-US"/>
           </a:p>
@@ -2915,7 +2916,7 @@
           <a:p>
             <a:fld id="{FD7FDEA3-D540-49FE-978B-AD0BE4744F9A}" type="datetimeFigureOut">
               <a:rPr lang="en-US" smtClean="0"/>
-              <a:t>1/25/2019</a:t>
+              <a:t>1/26/2019</a:t>
             </a:fld>
             <a:endParaRPr lang="en-US"/>
           </a:p>
@@ -3527,6 +3528,116 @@
           <p:cNvPr id="2" name="Title 1">
             <a:extLst>
               <a:ext uri="{FF2B5EF4-FFF2-40B4-BE49-F238E27FC236}">
+                <a16:creationId xmlns:a16="http://schemas.microsoft.com/office/drawing/2014/main" id="{EB4DF170-7B26-4C11-98D4-5A4E8835CD49}"/>
+              </a:ext>
+            </a:extLst>
+          </p:cNvPr>
+          <p:cNvSpPr>
+            <a:spLocks noGrp="1"/>
+          </p:cNvSpPr>
+          <p:nvPr>
+            <p:ph type="title"/>
+          </p:nvPr>
+        </p:nvSpPr>
+        <p:spPr/>
+        <p:txBody>
+          <a:bodyPr/>
+          <a:lstStyle/>
+          <a:p>
+            <a:endParaRPr lang="en-US"/>
+          </a:p>
+        </p:txBody>
+      </p:sp>
+      <p:sp>
+        <p:nvSpPr>
+          <p:cNvPr id="3" name="Content Placeholder 2">
+            <a:extLst>
+              <a:ext uri="{FF2B5EF4-FFF2-40B4-BE49-F238E27FC236}">
+                <a16:creationId xmlns:a16="http://schemas.microsoft.com/office/drawing/2014/main" id="{F9F89B12-7B23-4FC0-8EBB-88E6A2487821}"/>
+              </a:ext>
+            </a:extLst>
+          </p:cNvPr>
+          <p:cNvSpPr>
+            <a:spLocks noGrp="1"/>
+          </p:cNvSpPr>
+          <p:nvPr>
+            <p:ph idx="1"/>
+          </p:nvPr>
+        </p:nvSpPr>
+        <p:spPr/>
+        <p:txBody>
+          <a:bodyPr/>
+          <a:lstStyle/>
+          <a:p>
+            <a:endParaRPr lang="en-US"/>
+          </a:p>
+        </p:txBody>
+      </p:sp>
+      <p:pic>
+        <p:nvPicPr>
+          <p:cNvPr id="4" name="Picture 3">
+            <a:extLst>
+              <a:ext uri="{FF2B5EF4-FFF2-40B4-BE49-F238E27FC236}">
+                <a16:creationId xmlns:a16="http://schemas.microsoft.com/office/drawing/2014/main" id="{DC2E2E0D-6631-4E56-B030-B7958A6A77DA}"/>
+              </a:ext>
+            </a:extLst>
+          </p:cNvPr>
+          <p:cNvPicPr>
+            <a:picLocks noChangeAspect="1"/>
+          </p:cNvPicPr>
+          <p:nvPr/>
+        </p:nvPicPr>
+        <p:blipFill>
+          <a:blip r:embed="rId2"/>
+          <a:stretch>
+            <a:fillRect/>
+          </a:stretch>
+        </p:blipFill>
+        <p:spPr>
+          <a:xfrm>
+            <a:off x="0" y="1673"/>
+            <a:ext cx="12192000" cy="6854653"/>
+          </a:xfrm>
+          <a:prstGeom prst="rect">
+            <a:avLst/>
+          </a:prstGeom>
+        </p:spPr>
+      </p:pic>
+    </p:spTree>
+    <p:extLst>
+      <p:ext uri="{BB962C8B-B14F-4D97-AF65-F5344CB8AC3E}">
+        <p14:creationId xmlns:p14="http://schemas.microsoft.com/office/powerpoint/2010/main" val="1883637645"/>
+      </p:ext>
+    </p:extLst>
+  </p:cSld>
+  <p:clrMapOvr>
+    <a:masterClrMapping/>
+  </p:clrMapOvr>
+</p:sld>
+</file>
+
+<file path=ppt/slides/slide3.xml><?xml version="1.0" encoding="utf-8"?>
+<p:sld xmlns:a="http://schemas.openxmlformats.org/drawingml/2006/main" xmlns:r="http://schemas.openxmlformats.org/officeDocument/2006/relationships" xmlns:p="http://schemas.openxmlformats.org/presentationml/2006/main">
+  <p:cSld>
+    <p:spTree>
+      <p:nvGrpSpPr>
+        <p:cNvPr id="1" name=""/>
+        <p:cNvGrpSpPr/>
+        <p:nvPr/>
+      </p:nvGrpSpPr>
+      <p:grpSpPr>
+        <a:xfrm>
+          <a:off x="0" y="0"/>
+          <a:ext cx="0" cy="0"/>
+          <a:chOff x="0" y="0"/>
+          <a:chExt cx="0" cy="0"/>
+        </a:xfrm>
+      </p:grpSpPr>
+      <p:sp>
+        <p:nvSpPr>
+          <p:cNvPr id="2" name="Title 1">
+            <a:extLst>
+              <a:ext uri="{FF2B5EF4-FFF2-40B4-BE49-F238E27FC236}">
                 <a16:creationId xmlns:a16="http://schemas.microsoft.com/office/drawing/2014/main" id="{93E7B6BF-8610-4F62-866D-35E971FEA328}"/>
               </a:ext>
             </a:extLst>
@@ -3615,7 +3726,7 @@
 </p:sld>
 </file>
 
-<file path=ppt/slides/slide3.xml><?xml version="1.0" encoding="utf-8"?>
+<file path=ppt/slides/slide4.xml><?xml version="1.0" encoding="utf-8"?>
 <p:sld xmlns:a="http://schemas.openxmlformats.org/drawingml/2006/main" xmlns:r="http://schemas.openxmlformats.org/officeDocument/2006/relationships" xmlns:p="http://schemas.openxmlformats.org/presentationml/2006/main">
   <p:cSld>
     <p:spTree>
@@ -3725,7 +3836,7 @@
 </p:sld>
 </file>
 
-<file path=ppt/slides/slide4.xml><?xml version="1.0" encoding="utf-8"?>
+<file path=ppt/slides/slide5.xml><?xml version="1.0" encoding="utf-8"?>
 <p:sld xmlns:a="http://schemas.openxmlformats.org/drawingml/2006/main" xmlns:r="http://schemas.openxmlformats.org/officeDocument/2006/relationships" xmlns:p="http://schemas.openxmlformats.org/presentationml/2006/main">
   <p:cSld>
     <p:spTree>
@@ -3835,7 +3946,7 @@
 </p:sld>
 </file>
 
-<file path=ppt/slides/slide5.xml><?xml version="1.0" encoding="utf-8"?>
+<file path=ppt/slides/slide6.xml><?xml version="1.0" encoding="utf-8"?>
 <p:sld xmlns:a="http://schemas.openxmlformats.org/drawingml/2006/main" xmlns:r="http://schemas.openxmlformats.org/officeDocument/2006/relationships" xmlns:p="http://schemas.openxmlformats.org/presentationml/2006/main">
   <p:cSld>
     <p:spTree>
@@ -3945,7 +4056,7 @@
 </p:sld>
 </file>
 
-<file path=ppt/slides/slide6.xml><?xml version="1.0" encoding="utf-8"?>
+<file path=ppt/slides/slide7.xml><?xml version="1.0" encoding="utf-8"?>
 <p:sld xmlns:a="http://schemas.openxmlformats.org/drawingml/2006/main" xmlns:r="http://schemas.openxmlformats.org/officeDocument/2006/relationships" xmlns:p="http://schemas.openxmlformats.org/presentationml/2006/main">
   <p:cSld>
     <p:spTree>
@@ -4055,7 +4166,7 @@
 </p:sld>
 </file>
 
-<file path=ppt/slides/slide7.xml><?xml version="1.0" encoding="utf-8"?>
+<file path=ppt/slides/slide8.xml><?xml version="1.0" encoding="utf-8"?>
 <p:sld xmlns:a="http://schemas.openxmlformats.org/drawingml/2006/main" xmlns:r="http://schemas.openxmlformats.org/officeDocument/2006/relationships" xmlns:p="http://schemas.openxmlformats.org/presentationml/2006/main">
   <p:cSld>
     <p:spTree>

</xml_diff>